<commit_message>
Completed IAD GIT / DB Presentation 2
</commit_message>
<xml_diff>
--- a/src/DatabaseBuild/Graphics.pptx
+++ b/src/DatabaseBuild/Graphics.pptx
@@ -9,6 +9,7 @@
     <p:sldId id="258" r:id="rId3"/>
     <p:sldId id="259" r:id="rId4"/>
     <p:sldId id="257" r:id="rId5"/>
+    <p:sldId id="260" r:id="rId6"/>
   </p:sldIdLst>
   <p:sldSz cx="12192000" cy="6858000"/>
   <p:notesSz cx="6858000" cy="9144000"/>
@@ -115,10 +116,6 @@
 </p:presentation>
 </file>
 
-<file path=ppt/revisionInfo.xml><?xml version="1.0" encoding="utf-8"?>
-<p1510:revInfo xmlns:a="http://schemas.openxmlformats.org/drawingml/2006/main" xmlns:r="http://schemas.openxmlformats.org/officeDocument/2006/relationships" xmlns:p1510="http://schemas.microsoft.com/office/powerpoint/2015/10/main"/>
-</file>
-
 <file path=ppt/slideLayouts/slideLayout1.xml><?xml version="1.0" encoding="utf-8"?>
 <p:sldLayout xmlns:a="http://schemas.openxmlformats.org/drawingml/2006/main" xmlns:r="http://schemas.openxmlformats.org/officeDocument/2006/relationships" xmlns:p="http://schemas.openxmlformats.org/presentationml/2006/main" type="title" preserve="1">
   <p:cSld name="Title Slide">
@@ -266,7 +263,7 @@
           <a:p>
             <a:fld id="{7580C7AC-4302-40EB-AB0E-6049096607C2}" type="datetimeFigureOut">
               <a:rPr lang="en-US" smtClean="0"/>
-              <a:t>10/11/2018</a:t>
+              <a:t>1/23/2019</a:t>
             </a:fld>
             <a:endParaRPr lang="en-US"/>
           </a:p>
@@ -464,7 +461,7 @@
           <a:p>
             <a:fld id="{7580C7AC-4302-40EB-AB0E-6049096607C2}" type="datetimeFigureOut">
               <a:rPr lang="en-US" smtClean="0"/>
-              <a:t>10/11/2018</a:t>
+              <a:t>1/23/2019</a:t>
             </a:fld>
             <a:endParaRPr lang="en-US"/>
           </a:p>
@@ -672,7 +669,7 @@
           <a:p>
             <a:fld id="{7580C7AC-4302-40EB-AB0E-6049096607C2}" type="datetimeFigureOut">
               <a:rPr lang="en-US" smtClean="0"/>
-              <a:t>10/11/2018</a:t>
+              <a:t>1/23/2019</a:t>
             </a:fld>
             <a:endParaRPr lang="en-US"/>
           </a:p>
@@ -870,7 +867,7 @@
           <a:p>
             <a:fld id="{7580C7AC-4302-40EB-AB0E-6049096607C2}" type="datetimeFigureOut">
               <a:rPr lang="en-US" smtClean="0"/>
-              <a:t>10/11/2018</a:t>
+              <a:t>1/23/2019</a:t>
             </a:fld>
             <a:endParaRPr lang="en-US"/>
           </a:p>
@@ -1145,7 +1142,7 @@
           <a:p>
             <a:fld id="{7580C7AC-4302-40EB-AB0E-6049096607C2}" type="datetimeFigureOut">
               <a:rPr lang="en-US" smtClean="0"/>
-              <a:t>10/11/2018</a:t>
+              <a:t>1/23/2019</a:t>
             </a:fld>
             <a:endParaRPr lang="en-US"/>
           </a:p>
@@ -1410,7 +1407,7 @@
           <a:p>
             <a:fld id="{7580C7AC-4302-40EB-AB0E-6049096607C2}" type="datetimeFigureOut">
               <a:rPr lang="en-US" smtClean="0"/>
-              <a:t>10/11/2018</a:t>
+              <a:t>1/23/2019</a:t>
             </a:fld>
             <a:endParaRPr lang="en-US"/>
           </a:p>
@@ -1822,7 +1819,7 @@
           <a:p>
             <a:fld id="{7580C7AC-4302-40EB-AB0E-6049096607C2}" type="datetimeFigureOut">
               <a:rPr lang="en-US" smtClean="0"/>
-              <a:t>10/11/2018</a:t>
+              <a:t>1/23/2019</a:t>
             </a:fld>
             <a:endParaRPr lang="en-US"/>
           </a:p>
@@ -1963,7 +1960,7 @@
           <a:p>
             <a:fld id="{7580C7AC-4302-40EB-AB0E-6049096607C2}" type="datetimeFigureOut">
               <a:rPr lang="en-US" smtClean="0"/>
-              <a:t>10/11/2018</a:t>
+              <a:t>1/23/2019</a:t>
             </a:fld>
             <a:endParaRPr lang="en-US"/>
           </a:p>
@@ -2076,7 +2073,7 @@
           <a:p>
             <a:fld id="{7580C7AC-4302-40EB-AB0E-6049096607C2}" type="datetimeFigureOut">
               <a:rPr lang="en-US" smtClean="0"/>
-              <a:t>10/11/2018</a:t>
+              <a:t>1/23/2019</a:t>
             </a:fld>
             <a:endParaRPr lang="en-US"/>
           </a:p>
@@ -2387,7 +2384,7 @@
           <a:p>
             <a:fld id="{7580C7AC-4302-40EB-AB0E-6049096607C2}" type="datetimeFigureOut">
               <a:rPr lang="en-US" smtClean="0"/>
-              <a:t>10/11/2018</a:t>
+              <a:t>1/23/2019</a:t>
             </a:fld>
             <a:endParaRPr lang="en-US"/>
           </a:p>
@@ -2675,7 +2672,7 @@
           <a:p>
             <a:fld id="{7580C7AC-4302-40EB-AB0E-6049096607C2}" type="datetimeFigureOut">
               <a:rPr lang="en-US" smtClean="0"/>
-              <a:t>10/11/2018</a:t>
+              <a:t>1/23/2019</a:t>
             </a:fld>
             <a:endParaRPr lang="en-US"/>
           </a:p>
@@ -2916,7 +2913,7 @@
           <a:p>
             <a:fld id="{7580C7AC-4302-40EB-AB0E-6049096607C2}" type="datetimeFigureOut">
               <a:rPr lang="en-US" smtClean="0"/>
-              <a:t>10/11/2018</a:t>
+              <a:t>1/23/2019</a:t>
             </a:fld>
             <a:endParaRPr lang="en-US"/>
           </a:p>
@@ -5805,6 +5802,461 @@
 </p:sld>
 </file>
 
+<file path=ppt/slides/slide5.xml><?xml version="1.0" encoding="utf-8"?>
+<p:sld xmlns:a="http://schemas.openxmlformats.org/drawingml/2006/main" xmlns:r="http://schemas.openxmlformats.org/officeDocument/2006/relationships" xmlns:p="http://schemas.openxmlformats.org/presentationml/2006/main">
+  <p:cSld>
+    <p:spTree>
+      <p:nvGrpSpPr>
+        <p:cNvPr id="1" name=""/>
+        <p:cNvGrpSpPr/>
+        <p:nvPr/>
+      </p:nvGrpSpPr>
+      <p:grpSpPr>
+        <a:xfrm>
+          <a:off x="0" y="0"/>
+          <a:ext cx="0" cy="0"/>
+          <a:chOff x="0" y="0"/>
+          <a:chExt cx="0" cy="0"/>
+        </a:xfrm>
+      </p:grpSpPr>
+      <p:sp>
+        <p:nvSpPr>
+          <p:cNvPr id="4" name="Rectangle 3">
+            <a:extLst>
+              <a:ext uri="{FF2B5EF4-FFF2-40B4-BE49-F238E27FC236}">
+                <a16:creationId xmlns:a16="http://schemas.microsoft.com/office/drawing/2014/main" id="{3975DA26-C67F-469E-9BA9-DFBA1ACAE2E7}"/>
+              </a:ext>
+            </a:extLst>
+          </p:cNvPr>
+          <p:cNvSpPr/>
+          <p:nvPr/>
+        </p:nvSpPr>
+        <p:spPr>
+          <a:xfrm>
+            <a:off x="2989384" y="1940853"/>
+            <a:ext cx="2901462" cy="3809316"/>
+          </a:xfrm>
+          <a:prstGeom prst="rect">
+            <a:avLst/>
+          </a:prstGeom>
+        </p:spPr>
+        <p:style>
+          <a:lnRef idx="2">
+            <a:schemeClr val="dk1"/>
+          </a:lnRef>
+          <a:fillRef idx="1">
+            <a:schemeClr val="lt1"/>
+          </a:fillRef>
+          <a:effectRef idx="0">
+            <a:schemeClr val="dk1"/>
+          </a:effectRef>
+          <a:fontRef idx="minor">
+            <a:schemeClr val="dk1"/>
+          </a:fontRef>
+        </p:style>
+        <p:txBody>
+          <a:bodyPr rtlCol="0" anchor="ctr"/>
+          <a:lstStyle/>
+          <a:p>
+            <a:pPr algn="ctr"/>
+            <a:endParaRPr lang="en-US" dirty="0"/>
+          </a:p>
+        </p:txBody>
+      </p:sp>
+      <p:sp>
+        <p:nvSpPr>
+          <p:cNvPr id="3" name="Rectangle 2">
+            <a:extLst>
+              <a:ext uri="{FF2B5EF4-FFF2-40B4-BE49-F238E27FC236}">
+                <a16:creationId xmlns:a16="http://schemas.microsoft.com/office/drawing/2014/main" id="{D6A67742-FD34-4063-9D62-D5D8981B5012}"/>
+              </a:ext>
+            </a:extLst>
+          </p:cNvPr>
+          <p:cNvSpPr/>
+          <p:nvPr/>
+        </p:nvSpPr>
+        <p:spPr>
+          <a:xfrm>
+            <a:off x="3305474" y="2391508"/>
+            <a:ext cx="1257963" cy="2690446"/>
+          </a:xfrm>
+          <a:prstGeom prst="rect">
+            <a:avLst/>
+          </a:prstGeom>
+          <a:solidFill>
+            <a:schemeClr val="accent3">
+              <a:alpha val="50000"/>
+            </a:schemeClr>
+          </a:solidFill>
+          <a:ln>
+            <a:noFill/>
+          </a:ln>
+        </p:spPr>
+        <p:style>
+          <a:lnRef idx="0">
+            <a:scrgbClr r="0" g="0" b="0"/>
+          </a:lnRef>
+          <a:fillRef idx="0">
+            <a:scrgbClr r="0" g="0" b="0"/>
+          </a:fillRef>
+          <a:effectRef idx="0">
+            <a:scrgbClr r="0" g="0" b="0"/>
+          </a:effectRef>
+          <a:fontRef idx="minor">
+            <a:schemeClr val="lt1"/>
+          </a:fontRef>
+        </p:style>
+        <p:txBody>
+          <a:bodyPr rtlCol="0" anchor="ctr"/>
+          <a:lstStyle/>
+          <a:p>
+            <a:pPr algn="ctr"/>
+            <a:endParaRPr lang="en-US"/>
+          </a:p>
+        </p:txBody>
+      </p:sp>
+      <p:pic>
+        <p:nvPicPr>
+          <p:cNvPr id="8" name="Graphic 7" descr="Laptop">
+            <a:extLst>
+              <a:ext uri="{FF2B5EF4-FFF2-40B4-BE49-F238E27FC236}">
+                <a16:creationId xmlns:a16="http://schemas.microsoft.com/office/drawing/2014/main" id="{889EFEBA-4DAD-4156-99FD-EE004AA7C382}"/>
+              </a:ext>
+            </a:extLst>
+          </p:cNvPr>
+          <p:cNvPicPr>
+            <a:picLocks noChangeAspect="1"/>
+          </p:cNvPicPr>
+          <p:nvPr/>
+        </p:nvPicPr>
+        <p:blipFill>
+          <a:blip r:embed="rId2">
+            <a:extLst>
+              <a:ext uri="{28A0092B-C50C-407E-A947-70E740481C1C}">
+                <a14:useLocalDpi xmlns:a14="http://schemas.microsoft.com/office/drawing/2010/main" val="0"/>
+              </a:ext>
+              <a:ext uri="{96DAC541-7B7A-43D3-8B79-37D633B846F1}">
+                <asvg:svgBlip xmlns:asvg="http://schemas.microsoft.com/office/drawing/2016/SVG/main" r:embed="rId3"/>
+              </a:ext>
+            </a:extLst>
+          </a:blip>
+          <a:stretch>
+            <a:fillRect/>
+          </a:stretch>
+        </p:blipFill>
+        <p:spPr>
+          <a:xfrm>
+            <a:off x="2136531" y="1222131"/>
+            <a:ext cx="1380392" cy="1380392"/>
+          </a:xfrm>
+          <a:prstGeom prst="rect">
+            <a:avLst/>
+          </a:prstGeom>
+        </p:spPr>
+      </p:pic>
+      <p:pic>
+        <p:nvPicPr>
+          <p:cNvPr id="10" name="Graphic 9" descr="Document">
+            <a:extLst>
+              <a:ext uri="{FF2B5EF4-FFF2-40B4-BE49-F238E27FC236}">
+                <a16:creationId xmlns:a16="http://schemas.microsoft.com/office/drawing/2014/main" id="{698A13F3-37A8-4370-9011-7C3BCAD977FA}"/>
+              </a:ext>
+            </a:extLst>
+          </p:cNvPr>
+          <p:cNvPicPr>
+            <a:picLocks noChangeAspect="1"/>
+          </p:cNvPicPr>
+          <p:nvPr/>
+        </p:nvPicPr>
+        <p:blipFill>
+          <a:blip r:embed="rId4">
+            <a:extLst>
+              <a:ext uri="{28A0092B-C50C-407E-A947-70E740481C1C}">
+                <a14:useLocalDpi xmlns:a14="http://schemas.microsoft.com/office/drawing/2010/main" val="0"/>
+              </a:ext>
+              <a:ext uri="{96DAC541-7B7A-43D3-8B79-37D633B846F1}">
+                <asvg:svgBlip xmlns:asvg="http://schemas.microsoft.com/office/drawing/2016/SVG/main" r:embed="rId5"/>
+              </a:ext>
+            </a:extLst>
+          </a:blip>
+          <a:stretch>
+            <a:fillRect/>
+          </a:stretch>
+        </p:blipFill>
+        <p:spPr>
+          <a:xfrm>
+            <a:off x="3435587" y="2490369"/>
+            <a:ext cx="914400" cy="914400"/>
+          </a:xfrm>
+          <a:prstGeom prst="rect">
+            <a:avLst/>
+          </a:prstGeom>
+        </p:spPr>
+      </p:pic>
+      <p:pic>
+        <p:nvPicPr>
+          <p:cNvPr id="12" name="Graphic 11" descr="Open Folder">
+            <a:extLst>
+              <a:ext uri="{FF2B5EF4-FFF2-40B4-BE49-F238E27FC236}">
+                <a16:creationId xmlns:a16="http://schemas.microsoft.com/office/drawing/2014/main" id="{3E97AF17-3002-4A4F-8D55-EB3DDF305E88}"/>
+              </a:ext>
+            </a:extLst>
+          </p:cNvPr>
+          <p:cNvPicPr>
+            <a:picLocks noChangeAspect="1"/>
+          </p:cNvPicPr>
+          <p:nvPr/>
+        </p:nvPicPr>
+        <p:blipFill>
+          <a:blip r:embed="rId6">
+            <a:extLst>
+              <a:ext uri="{28A0092B-C50C-407E-A947-70E740481C1C}">
+                <a14:useLocalDpi xmlns:a14="http://schemas.microsoft.com/office/drawing/2010/main" val="0"/>
+              </a:ext>
+              <a:ext uri="{96DAC541-7B7A-43D3-8B79-37D633B846F1}">
+                <asvg:svgBlip xmlns:asvg="http://schemas.microsoft.com/office/drawing/2016/SVG/main" r:embed="rId7"/>
+              </a:ext>
+            </a:extLst>
+          </a:blip>
+          <a:stretch>
+            <a:fillRect/>
+          </a:stretch>
+        </p:blipFill>
+        <p:spPr>
+          <a:xfrm>
+            <a:off x="3516923" y="3712507"/>
+            <a:ext cx="914400" cy="914400"/>
+          </a:xfrm>
+          <a:prstGeom prst="rect">
+            <a:avLst/>
+          </a:prstGeom>
+        </p:spPr>
+      </p:pic>
+      <p:sp>
+        <p:nvSpPr>
+          <p:cNvPr id="13" name="Cylinder 12">
+            <a:extLst>
+              <a:ext uri="{FF2B5EF4-FFF2-40B4-BE49-F238E27FC236}">
+                <a16:creationId xmlns:a16="http://schemas.microsoft.com/office/drawing/2014/main" id="{A900FBD4-AE34-4FC0-AE36-A575BEE94294}"/>
+              </a:ext>
+            </a:extLst>
+          </p:cNvPr>
+          <p:cNvSpPr/>
+          <p:nvPr/>
+        </p:nvSpPr>
+        <p:spPr>
+          <a:xfrm>
+            <a:off x="4744478" y="3855423"/>
+            <a:ext cx="687519" cy="677010"/>
+          </a:xfrm>
+          <a:prstGeom prst="can">
+            <a:avLst/>
+          </a:prstGeom>
+        </p:spPr>
+        <p:style>
+          <a:lnRef idx="1">
+            <a:schemeClr val="accent5"/>
+          </a:lnRef>
+          <a:fillRef idx="3">
+            <a:schemeClr val="accent5"/>
+          </a:fillRef>
+          <a:effectRef idx="2">
+            <a:schemeClr val="accent5"/>
+          </a:effectRef>
+          <a:fontRef idx="minor">
+            <a:schemeClr val="lt1"/>
+          </a:fontRef>
+        </p:style>
+        <p:txBody>
+          <a:bodyPr rtlCol="0" anchor="ctr"/>
+          <a:lstStyle/>
+          <a:p>
+            <a:pPr algn="ctr"/>
+            <a:endParaRPr lang="en-US"/>
+          </a:p>
+        </p:txBody>
+      </p:sp>
+      <p:sp>
+        <p:nvSpPr>
+          <p:cNvPr id="14" name="TextBox 13">
+            <a:extLst>
+              <a:ext uri="{FF2B5EF4-FFF2-40B4-BE49-F238E27FC236}">
+                <a16:creationId xmlns:a16="http://schemas.microsoft.com/office/drawing/2014/main" id="{952EE61C-0FD6-41B1-AF2E-5D95A231C203}"/>
+              </a:ext>
+            </a:extLst>
+          </p:cNvPr>
+          <p:cNvSpPr txBox="1"/>
+          <p:nvPr/>
+        </p:nvSpPr>
+        <p:spPr>
+          <a:xfrm>
+            <a:off x="3411947" y="3371749"/>
+            <a:ext cx="1011046" cy="307777"/>
+          </a:xfrm>
+          <a:prstGeom prst="rect">
+            <a:avLst/>
+          </a:prstGeom>
+          <a:noFill/>
+        </p:spPr>
+        <p:txBody>
+          <a:bodyPr wrap="none" rtlCol="0">
+            <a:spAutoFit/>
+          </a:bodyPr>
+          <a:lstStyle/>
+          <a:p>
+            <a:r>
+              <a:rPr lang="en-US" sz="1400" dirty="0"/>
+              <a:t>Build Script</a:t>
+            </a:r>
+          </a:p>
+        </p:txBody>
+      </p:sp>
+      <p:sp>
+        <p:nvSpPr>
+          <p:cNvPr id="15" name="TextBox 14">
+            <a:extLst>
+              <a:ext uri="{FF2B5EF4-FFF2-40B4-BE49-F238E27FC236}">
+                <a16:creationId xmlns:a16="http://schemas.microsoft.com/office/drawing/2014/main" id="{95792509-C9BE-4A10-AD32-86EEC4CCD61E}"/>
+              </a:ext>
+            </a:extLst>
+          </p:cNvPr>
+          <p:cNvSpPr txBox="1"/>
+          <p:nvPr/>
+        </p:nvSpPr>
+        <p:spPr>
+          <a:xfrm>
+            <a:off x="3305474" y="4481773"/>
+            <a:ext cx="1223027" cy="523220"/>
+          </a:xfrm>
+          <a:prstGeom prst="rect">
+            <a:avLst/>
+          </a:prstGeom>
+          <a:noFill/>
+        </p:spPr>
+        <p:txBody>
+          <a:bodyPr wrap="none" rtlCol="0">
+            <a:spAutoFit/>
+          </a:bodyPr>
+          <a:lstStyle/>
+          <a:p>
+            <a:pPr algn="ctr"/>
+            <a:r>
+              <a:rPr lang="en-US" sz="1400" dirty="0"/>
+              <a:t>SQL Transition</a:t>
+            </a:r>
+          </a:p>
+          <a:p>
+            <a:pPr algn="ctr"/>
+            <a:r>
+              <a:rPr lang="en-US" sz="1400" dirty="0"/>
+              <a:t>Scripts</a:t>
+            </a:r>
+          </a:p>
+        </p:txBody>
+      </p:sp>
+      <p:sp>
+        <p:nvSpPr>
+          <p:cNvPr id="16" name="TextBox 15">
+            <a:extLst>
+              <a:ext uri="{FF2B5EF4-FFF2-40B4-BE49-F238E27FC236}">
+                <a16:creationId xmlns:a16="http://schemas.microsoft.com/office/drawing/2014/main" id="{AFD17891-A4DD-4DD2-A6DD-AB7275DAC1CE}"/>
+              </a:ext>
+            </a:extLst>
+          </p:cNvPr>
+          <p:cNvSpPr txBox="1"/>
+          <p:nvPr/>
+        </p:nvSpPr>
+        <p:spPr>
+          <a:xfrm>
+            <a:off x="4563437" y="4626907"/>
+            <a:ext cx="1054328" cy="523220"/>
+          </a:xfrm>
+          <a:prstGeom prst="rect">
+            <a:avLst/>
+          </a:prstGeom>
+          <a:noFill/>
+        </p:spPr>
+        <p:txBody>
+          <a:bodyPr wrap="none" rtlCol="0">
+            <a:spAutoFit/>
+          </a:bodyPr>
+          <a:lstStyle/>
+          <a:p>
+            <a:pPr algn="ctr"/>
+            <a:r>
+              <a:rPr lang="en-US" sz="1400" dirty="0"/>
+              <a:t>SQL Express</a:t>
+            </a:r>
+          </a:p>
+          <a:p>
+            <a:pPr algn="ctr"/>
+            <a:r>
+              <a:rPr lang="en-US" sz="1400" dirty="0"/>
+              <a:t>Database</a:t>
+            </a:r>
+          </a:p>
+        </p:txBody>
+      </p:sp>
+      <p:sp>
+        <p:nvSpPr>
+          <p:cNvPr id="2" name="Rectangle 1">
+            <a:extLst>
+              <a:ext uri="{FF2B5EF4-FFF2-40B4-BE49-F238E27FC236}">
+                <a16:creationId xmlns:a16="http://schemas.microsoft.com/office/drawing/2014/main" id="{9D78B734-5F14-48A2-9B94-7B7E1097D584}"/>
+              </a:ext>
+            </a:extLst>
+          </p:cNvPr>
+          <p:cNvSpPr/>
+          <p:nvPr/>
+        </p:nvSpPr>
+        <p:spPr>
+          <a:xfrm>
+            <a:off x="3191607" y="5197339"/>
+            <a:ext cx="2497015" cy="360484"/>
+          </a:xfrm>
+          <a:prstGeom prst="rect">
+            <a:avLst/>
+          </a:prstGeom>
+        </p:spPr>
+        <p:style>
+          <a:lnRef idx="1">
+            <a:schemeClr val="accent3"/>
+          </a:lnRef>
+          <a:fillRef idx="3">
+            <a:schemeClr val="accent3"/>
+          </a:fillRef>
+          <a:effectRef idx="2">
+            <a:schemeClr val="accent3"/>
+          </a:effectRef>
+          <a:fontRef idx="minor">
+            <a:schemeClr val="lt1"/>
+          </a:fontRef>
+        </p:style>
+        <p:txBody>
+          <a:bodyPr rtlCol="0" anchor="ctr"/>
+          <a:lstStyle/>
+          <a:p>
+            <a:pPr algn="ctr"/>
+            <a:r>
+              <a:rPr lang="en-US" dirty="0"/>
+              <a:t>Source Control</a:t>
+            </a:r>
+          </a:p>
+        </p:txBody>
+      </p:sp>
+    </p:spTree>
+    <p:extLst>
+      <p:ext uri="{BB962C8B-B14F-4D97-AF65-F5344CB8AC3E}">
+        <p14:creationId xmlns:p14="http://schemas.microsoft.com/office/powerpoint/2010/main" val="3727417929"/>
+      </p:ext>
+    </p:extLst>
+  </p:cSld>
+  <p:clrMapOvr>
+    <a:masterClrMapping/>
+  </p:clrMapOvr>
+</p:sld>
+</file>
+
 <file path=ppt/theme/theme1.xml><?xml version="1.0" encoding="utf-8"?>
 <a:theme xmlns:a="http://schemas.openxmlformats.org/drawingml/2006/main" name="Office Theme">
   <a:themeElements>

</xml_diff>